<commit_message>
♻️ REFACTOR: `stage` -> `project`
It was felt that this is conceptually easier to understand,
i.e. it is a list of records for each notebook (& associated data) in the project,
rather than just a staging area for pre-executed notebooks.
</commit_message>
<xml_diff>
--- a/docs/using/images/execution_flow.pptx
+++ b/docs/using/images/execution_flow.pptx
@@ -262,7 +262,7 @@
           <a:p>
             <a:fld id="{83AD0D2E-8484-7741-9BC5-38744ADFCE35}" type="datetimeFigureOut">
               <a:rPr lang="en-GB" smtClean="0"/>
-              <a:t>13/03/2020</a:t>
+              <a:t>02/08/2021</a:t>
             </a:fld>
             <a:endParaRPr lang="en-GB"/>
           </a:p>
@@ -462,7 +462,7 @@
           <a:p>
             <a:fld id="{83AD0D2E-8484-7741-9BC5-38744ADFCE35}" type="datetimeFigureOut">
               <a:rPr lang="en-GB" smtClean="0"/>
-              <a:t>13/03/2020</a:t>
+              <a:t>02/08/2021</a:t>
             </a:fld>
             <a:endParaRPr lang="en-GB"/>
           </a:p>
@@ -672,7 +672,7 @@
           <a:p>
             <a:fld id="{83AD0D2E-8484-7741-9BC5-38744ADFCE35}" type="datetimeFigureOut">
               <a:rPr lang="en-GB" smtClean="0"/>
-              <a:t>13/03/2020</a:t>
+              <a:t>02/08/2021</a:t>
             </a:fld>
             <a:endParaRPr lang="en-GB"/>
           </a:p>
@@ -872,7 +872,7 @@
           <a:p>
             <a:fld id="{83AD0D2E-8484-7741-9BC5-38744ADFCE35}" type="datetimeFigureOut">
               <a:rPr lang="en-GB" smtClean="0"/>
-              <a:t>13/03/2020</a:t>
+              <a:t>02/08/2021</a:t>
             </a:fld>
             <a:endParaRPr lang="en-GB"/>
           </a:p>
@@ -1148,7 +1148,7 @@
           <a:p>
             <a:fld id="{83AD0D2E-8484-7741-9BC5-38744ADFCE35}" type="datetimeFigureOut">
               <a:rPr lang="en-GB" smtClean="0"/>
-              <a:t>13/03/2020</a:t>
+              <a:t>02/08/2021</a:t>
             </a:fld>
             <a:endParaRPr lang="en-GB"/>
           </a:p>
@@ -1416,7 +1416,7 @@
           <a:p>
             <a:fld id="{83AD0D2E-8484-7741-9BC5-38744ADFCE35}" type="datetimeFigureOut">
               <a:rPr lang="en-GB" smtClean="0"/>
-              <a:t>13/03/2020</a:t>
+              <a:t>02/08/2021</a:t>
             </a:fld>
             <a:endParaRPr lang="en-GB"/>
           </a:p>
@@ -1831,7 +1831,7 @@
           <a:p>
             <a:fld id="{83AD0D2E-8484-7741-9BC5-38744ADFCE35}" type="datetimeFigureOut">
               <a:rPr lang="en-GB" smtClean="0"/>
-              <a:t>13/03/2020</a:t>
+              <a:t>02/08/2021</a:t>
             </a:fld>
             <a:endParaRPr lang="en-GB"/>
           </a:p>
@@ -1973,7 +1973,7 @@
           <a:p>
             <a:fld id="{83AD0D2E-8484-7741-9BC5-38744ADFCE35}" type="datetimeFigureOut">
               <a:rPr lang="en-GB" smtClean="0"/>
-              <a:t>13/03/2020</a:t>
+              <a:t>02/08/2021</a:t>
             </a:fld>
             <a:endParaRPr lang="en-GB"/>
           </a:p>
@@ -2086,7 +2086,7 @@
           <a:p>
             <a:fld id="{83AD0D2E-8484-7741-9BC5-38744ADFCE35}" type="datetimeFigureOut">
               <a:rPr lang="en-GB" smtClean="0"/>
-              <a:t>13/03/2020</a:t>
+              <a:t>02/08/2021</a:t>
             </a:fld>
             <a:endParaRPr lang="en-GB"/>
           </a:p>
@@ -2399,7 +2399,7 @@
           <a:p>
             <a:fld id="{83AD0D2E-8484-7741-9BC5-38744ADFCE35}" type="datetimeFigureOut">
               <a:rPr lang="en-GB" smtClean="0"/>
-              <a:t>13/03/2020</a:t>
+              <a:t>02/08/2021</a:t>
             </a:fld>
             <a:endParaRPr lang="en-GB"/>
           </a:p>
@@ -2688,7 +2688,7 @@
           <a:p>
             <a:fld id="{83AD0D2E-8484-7741-9BC5-38744ADFCE35}" type="datetimeFigureOut">
               <a:rPr lang="en-GB" smtClean="0"/>
-              <a:t>13/03/2020</a:t>
+              <a:t>02/08/2021</a:t>
             </a:fld>
             <a:endParaRPr lang="en-GB"/>
           </a:p>
@@ -2931,7 +2931,7 @@
           <a:p>
             <a:fld id="{83AD0D2E-8484-7741-9BC5-38744ADFCE35}" type="datetimeFigureOut">
               <a:rPr lang="en-GB" smtClean="0"/>
-              <a:t>13/03/2020</a:t>
+              <a:t>02/08/2021</a:t>
             </a:fld>
             <a:endParaRPr lang="en-GB"/>
           </a:p>
@@ -3362,10 +3362,10 @@
         </p:nvGrpSpPr>
         <p:grpSpPr>
           <a:xfrm>
-            <a:off x="7741786" y="170485"/>
-            <a:ext cx="2602471" cy="2518533"/>
-            <a:chOff x="1160059" y="696036"/>
-            <a:chExt cx="3957851" cy="2518533"/>
+            <a:off x="7741786" y="402549"/>
+            <a:ext cx="2602471" cy="2286469"/>
+            <a:chOff x="1160059" y="928100"/>
+            <a:chExt cx="3957850" cy="2286469"/>
           </a:xfrm>
         </p:grpSpPr>
         <p:sp>
@@ -3382,8 +3382,8 @@
           </p:nvSpPr>
           <p:spPr>
             <a:xfrm>
-              <a:off x="1160059" y="696036"/>
-              <a:ext cx="3957851" cy="2518533"/>
+              <a:off x="1160059" y="928100"/>
+              <a:ext cx="3957850" cy="2286469"/>
             </a:xfrm>
             <a:prstGeom prst="roundRect">
               <a:avLst/>
@@ -3410,7 +3410,7 @@
               <a:pPr algn="ctr"/>
               <a:r>
                 <a:rPr lang="en-GB" dirty="0"/>
-                <a:t>NORMAL/SOURCE FOLDER</a:t>
+                <a:t>PROJECT FOLDER</a:t>
               </a:r>
             </a:p>
           </p:txBody>
@@ -3569,7 +3569,7 @@
             </a:pPr>
             <a:r>
               <a:rPr lang="en-GB" dirty="0"/>
-              <a:t>Get notebook path from staged DB</a:t>
+              <a:t>Get notebook path from database</a:t>
             </a:r>
           </a:p>
           <a:p>
@@ -3578,7 +3578,7 @@
             </a:pPr>
             <a:r>
               <a:rPr lang="en-GB" dirty="0"/>
-              <a:t>Get actual notebook from source folder</a:t>
+              <a:t>Get actual notebook from project folder</a:t>
             </a:r>
           </a:p>
           <a:p>
@@ -3604,7 +3604,15 @@
             </a:pPr>
             <a:r>
               <a:rPr lang="en-GB" dirty="0"/>
-              <a:t>If not, copy notebook and execute</a:t>
+              <a:t>If not</a:t>
+            </a:r>
+            <a:r>
+              <a:rPr lang="en-GB"/>
+              <a:t>, read </a:t>
+            </a:r>
+            <a:r>
+              <a:rPr lang="en-GB" dirty="0"/>
+              <a:t>notebook and execute</a:t>
             </a:r>
           </a:p>
           <a:p>
@@ -3613,7 +3621,7 @@
             </a:pPr>
             <a:r>
               <a:rPr lang="en-GB" dirty="0"/>
-              <a:t>If successful, copy executed notebook to the cache.</a:t>
+              <a:t>If successful, write executed notebook to the cache.</a:t>
             </a:r>
           </a:p>
           <a:p>
@@ -3895,7 +3903,7 @@
               <a:pPr algn="ctr"/>
               <a:r>
                 <a:rPr lang="en-GB" dirty="0"/>
-                <a:t>STAGED NOTEBOOK DB</a:t>
+                <a:t>PROJECT DATABASE</a:t>
               </a:r>
             </a:p>
           </p:txBody>

</xml_diff>

<commit_message>
♻️ REFACTOR: package API/CLI/documentation (#74)
This commit re-writes key parts of the package,
(a) to add additional functionality,
and (b) with a view to eventually exposing this CLI in https://jupyterbook.org/.

Key changes:

1. `stage`/`staging` is now rephrased to `notebook`, plus the addition of `project`, i.e. you add notebooks to a project, then execute them
2. notebook `read_data` is specified per notebook in the project, allowing for multiple types of file to be read/executed via the CLI (e.g. MyST Markdown files, via https://jupytext.readthedocs.io). 
  Before, the read functions were passed directly to the API methods.
3. The executor can be specified with `jbcache execute --executor`, and a parallel notebook executor has been added.
4. Improved execution status indicator in `jbcache project list` and other CLI improvements
4. Re-write of documentation, including better front page, with quick start guide and better logo.
</commit_message>
<xml_diff>
--- a/docs/using/images/execution_flow.pptx
+++ b/docs/using/images/execution_flow.pptx
@@ -262,7 +262,7 @@
           <a:p>
             <a:fld id="{83AD0D2E-8484-7741-9BC5-38744ADFCE35}" type="datetimeFigureOut">
               <a:rPr lang="en-GB" smtClean="0"/>
-              <a:t>13/03/2020</a:t>
+              <a:t>02/08/2021</a:t>
             </a:fld>
             <a:endParaRPr lang="en-GB"/>
           </a:p>
@@ -462,7 +462,7 @@
           <a:p>
             <a:fld id="{83AD0D2E-8484-7741-9BC5-38744ADFCE35}" type="datetimeFigureOut">
               <a:rPr lang="en-GB" smtClean="0"/>
-              <a:t>13/03/2020</a:t>
+              <a:t>02/08/2021</a:t>
             </a:fld>
             <a:endParaRPr lang="en-GB"/>
           </a:p>
@@ -672,7 +672,7 @@
           <a:p>
             <a:fld id="{83AD0D2E-8484-7741-9BC5-38744ADFCE35}" type="datetimeFigureOut">
               <a:rPr lang="en-GB" smtClean="0"/>
-              <a:t>13/03/2020</a:t>
+              <a:t>02/08/2021</a:t>
             </a:fld>
             <a:endParaRPr lang="en-GB"/>
           </a:p>
@@ -872,7 +872,7 @@
           <a:p>
             <a:fld id="{83AD0D2E-8484-7741-9BC5-38744ADFCE35}" type="datetimeFigureOut">
               <a:rPr lang="en-GB" smtClean="0"/>
-              <a:t>13/03/2020</a:t>
+              <a:t>02/08/2021</a:t>
             </a:fld>
             <a:endParaRPr lang="en-GB"/>
           </a:p>
@@ -1148,7 +1148,7 @@
           <a:p>
             <a:fld id="{83AD0D2E-8484-7741-9BC5-38744ADFCE35}" type="datetimeFigureOut">
               <a:rPr lang="en-GB" smtClean="0"/>
-              <a:t>13/03/2020</a:t>
+              <a:t>02/08/2021</a:t>
             </a:fld>
             <a:endParaRPr lang="en-GB"/>
           </a:p>
@@ -1416,7 +1416,7 @@
           <a:p>
             <a:fld id="{83AD0D2E-8484-7741-9BC5-38744ADFCE35}" type="datetimeFigureOut">
               <a:rPr lang="en-GB" smtClean="0"/>
-              <a:t>13/03/2020</a:t>
+              <a:t>02/08/2021</a:t>
             </a:fld>
             <a:endParaRPr lang="en-GB"/>
           </a:p>
@@ -1831,7 +1831,7 @@
           <a:p>
             <a:fld id="{83AD0D2E-8484-7741-9BC5-38744ADFCE35}" type="datetimeFigureOut">
               <a:rPr lang="en-GB" smtClean="0"/>
-              <a:t>13/03/2020</a:t>
+              <a:t>02/08/2021</a:t>
             </a:fld>
             <a:endParaRPr lang="en-GB"/>
           </a:p>
@@ -1973,7 +1973,7 @@
           <a:p>
             <a:fld id="{83AD0D2E-8484-7741-9BC5-38744ADFCE35}" type="datetimeFigureOut">
               <a:rPr lang="en-GB" smtClean="0"/>
-              <a:t>13/03/2020</a:t>
+              <a:t>02/08/2021</a:t>
             </a:fld>
             <a:endParaRPr lang="en-GB"/>
           </a:p>
@@ -2086,7 +2086,7 @@
           <a:p>
             <a:fld id="{83AD0D2E-8484-7741-9BC5-38744ADFCE35}" type="datetimeFigureOut">
               <a:rPr lang="en-GB" smtClean="0"/>
-              <a:t>13/03/2020</a:t>
+              <a:t>02/08/2021</a:t>
             </a:fld>
             <a:endParaRPr lang="en-GB"/>
           </a:p>
@@ -2399,7 +2399,7 @@
           <a:p>
             <a:fld id="{83AD0D2E-8484-7741-9BC5-38744ADFCE35}" type="datetimeFigureOut">
               <a:rPr lang="en-GB" smtClean="0"/>
-              <a:t>13/03/2020</a:t>
+              <a:t>02/08/2021</a:t>
             </a:fld>
             <a:endParaRPr lang="en-GB"/>
           </a:p>
@@ -2688,7 +2688,7 @@
           <a:p>
             <a:fld id="{83AD0D2E-8484-7741-9BC5-38744ADFCE35}" type="datetimeFigureOut">
               <a:rPr lang="en-GB" smtClean="0"/>
-              <a:t>13/03/2020</a:t>
+              <a:t>02/08/2021</a:t>
             </a:fld>
             <a:endParaRPr lang="en-GB"/>
           </a:p>
@@ -2931,7 +2931,7 @@
           <a:p>
             <a:fld id="{83AD0D2E-8484-7741-9BC5-38744ADFCE35}" type="datetimeFigureOut">
               <a:rPr lang="en-GB" smtClean="0"/>
-              <a:t>13/03/2020</a:t>
+              <a:t>02/08/2021</a:t>
             </a:fld>
             <a:endParaRPr lang="en-GB"/>
           </a:p>
@@ -3362,10 +3362,10 @@
         </p:nvGrpSpPr>
         <p:grpSpPr>
           <a:xfrm>
-            <a:off x="7741786" y="170485"/>
-            <a:ext cx="2602471" cy="2518533"/>
-            <a:chOff x="1160059" y="696036"/>
-            <a:chExt cx="3957851" cy="2518533"/>
+            <a:off x="7741786" y="402549"/>
+            <a:ext cx="2602471" cy="2286469"/>
+            <a:chOff x="1160059" y="928100"/>
+            <a:chExt cx="3957850" cy="2286469"/>
           </a:xfrm>
         </p:grpSpPr>
         <p:sp>
@@ -3382,8 +3382,8 @@
           </p:nvSpPr>
           <p:spPr>
             <a:xfrm>
-              <a:off x="1160059" y="696036"/>
-              <a:ext cx="3957851" cy="2518533"/>
+              <a:off x="1160059" y="928100"/>
+              <a:ext cx="3957850" cy="2286469"/>
             </a:xfrm>
             <a:prstGeom prst="roundRect">
               <a:avLst/>
@@ -3410,7 +3410,7 @@
               <a:pPr algn="ctr"/>
               <a:r>
                 <a:rPr lang="en-GB" dirty="0"/>
-                <a:t>NORMAL/SOURCE FOLDER</a:t>
+                <a:t>PROJECT FOLDER</a:t>
               </a:r>
             </a:p>
           </p:txBody>
@@ -3569,7 +3569,7 @@
             </a:pPr>
             <a:r>
               <a:rPr lang="en-GB" dirty="0"/>
-              <a:t>Get notebook path from staged DB</a:t>
+              <a:t>Get notebook path from database</a:t>
             </a:r>
           </a:p>
           <a:p>
@@ -3578,7 +3578,7 @@
             </a:pPr>
             <a:r>
               <a:rPr lang="en-GB" dirty="0"/>
-              <a:t>Get actual notebook from source folder</a:t>
+              <a:t>Get actual notebook from project folder</a:t>
             </a:r>
           </a:p>
           <a:p>
@@ -3604,7 +3604,15 @@
             </a:pPr>
             <a:r>
               <a:rPr lang="en-GB" dirty="0"/>
-              <a:t>If not, copy notebook and execute</a:t>
+              <a:t>If not</a:t>
+            </a:r>
+            <a:r>
+              <a:rPr lang="en-GB"/>
+              <a:t>, read </a:t>
+            </a:r>
+            <a:r>
+              <a:rPr lang="en-GB" dirty="0"/>
+              <a:t>notebook and execute</a:t>
             </a:r>
           </a:p>
           <a:p>
@@ -3613,7 +3621,7 @@
             </a:pPr>
             <a:r>
               <a:rPr lang="en-GB" dirty="0"/>
-              <a:t>If successful, copy executed notebook to the cache.</a:t>
+              <a:t>If successful, write executed notebook to the cache.</a:t>
             </a:r>
           </a:p>
           <a:p>
@@ -3895,7 +3903,7 @@
               <a:pPr algn="ctr"/>
               <a:r>
                 <a:rPr lang="en-GB" dirty="0"/>
-                <a:t>STAGED NOTEBOOK DB</a:t>
+                <a:t>PROJECT DATABASE</a:t>
               </a:r>
             </a:p>
           </p:txBody>

</xml_diff>